<commit_message>
feat: adicionado script para execucao da rede
</commit_message>
<xml_diff>
--- a/docs/Redes Neuras em Visão Computacional.pptx
+++ b/docs/Redes Neuras em Visão Computacional.pptx
@@ -128,6 +128,11 @@
       </a:defRPr>
     </a:lvl9pPr>
   </p:defaultTextStyle>
+  <p:extLst>
+    <p:ext uri="{EFAFB233-063F-42B5-8137-9DF3F51BA10A}">
+      <p15:sldGuideLst xmlns:p15="http://schemas.microsoft.com/office/powerpoint/2012/main"/>
+    </p:ext>
+  </p:extLst>
 </p:presentation>
 </file>
 
@@ -218,7 +223,7 @@
           <a:p>
             <a:fld id="{9BF3D972-3798-48EA-BE69-B162682BAB0A}" type="datetimeFigureOut">
               <a:rPr lang="pt-BR" smtClean="0"/>
-              <a:t>25/04/2023</a:t>
+              <a:t>26/04/2023</a:t>
             </a:fld>
             <a:endParaRPr lang="pt-BR"/>
           </a:p>
@@ -440,7 +445,7 @@
           <a:p>
             <a:fld id="{9BF3D972-3798-48EA-BE69-B162682BAB0A}" type="datetimeFigureOut">
               <a:rPr lang="pt-BR" smtClean="0"/>
-              <a:t>25/04/2023</a:t>
+              <a:t>26/04/2023</a:t>
             </a:fld>
             <a:endParaRPr lang="pt-BR"/>
           </a:p>
@@ -672,7 +677,7 @@
           <a:p>
             <a:fld id="{9BF3D972-3798-48EA-BE69-B162682BAB0A}" type="datetimeFigureOut">
               <a:rPr lang="pt-BR" smtClean="0"/>
-              <a:t>25/04/2023</a:t>
+              <a:t>26/04/2023</a:t>
             </a:fld>
             <a:endParaRPr lang="pt-BR"/>
           </a:p>
@@ -928,7 +933,7 @@
           <a:p>
             <a:fld id="{9BF3D972-3798-48EA-BE69-B162682BAB0A}" type="datetimeFigureOut">
               <a:rPr lang="pt-BR" smtClean="0"/>
-              <a:t>25/04/2023</a:t>
+              <a:t>26/04/2023</a:t>
             </a:fld>
             <a:endParaRPr lang="pt-BR"/>
           </a:p>
@@ -1227,7 +1232,7 @@
           <a:p>
             <a:fld id="{9BF3D972-3798-48EA-BE69-B162682BAB0A}" type="datetimeFigureOut">
               <a:rPr lang="pt-BR" smtClean="0"/>
-              <a:t>25/04/2023</a:t>
+              <a:t>26/04/2023</a:t>
             </a:fld>
             <a:endParaRPr lang="pt-BR"/>
           </a:p>
@@ -1574,7 +1579,7 @@
           <a:p>
             <a:fld id="{9BF3D972-3798-48EA-BE69-B162682BAB0A}" type="datetimeFigureOut">
               <a:rPr lang="pt-BR" smtClean="0"/>
-              <a:t>25/04/2023</a:t>
+              <a:t>26/04/2023</a:t>
             </a:fld>
             <a:endParaRPr lang="pt-BR"/>
           </a:p>
@@ -2010,7 +2015,7 @@
           <a:p>
             <a:fld id="{9BF3D972-3798-48EA-BE69-B162682BAB0A}" type="datetimeFigureOut">
               <a:rPr lang="pt-BR" smtClean="0"/>
-              <a:t>25/04/2023</a:t>
+              <a:t>26/04/2023</a:t>
             </a:fld>
             <a:endParaRPr lang="pt-BR"/>
           </a:p>
@@ -2175,7 +2180,7 @@
           <a:p>
             <a:fld id="{9BF3D972-3798-48EA-BE69-B162682BAB0A}" type="datetimeFigureOut">
               <a:rPr lang="pt-BR" smtClean="0"/>
-              <a:t>25/04/2023</a:t>
+              <a:t>26/04/2023</a:t>
             </a:fld>
             <a:endParaRPr lang="pt-BR"/>
           </a:p>
@@ -2312,7 +2317,7 @@
           <a:p>
             <a:fld id="{9BF3D972-3798-48EA-BE69-B162682BAB0A}" type="datetimeFigureOut">
               <a:rPr lang="pt-BR" smtClean="0"/>
-              <a:t>25/04/2023</a:t>
+              <a:t>26/04/2023</a:t>
             </a:fld>
             <a:endParaRPr lang="pt-BR"/>
           </a:p>
@@ -2647,7 +2652,7 @@
           <a:p>
             <a:fld id="{9BF3D972-3798-48EA-BE69-B162682BAB0A}" type="datetimeFigureOut">
               <a:rPr lang="pt-BR" smtClean="0"/>
-              <a:t>25/04/2023</a:t>
+              <a:t>26/04/2023</a:t>
             </a:fld>
             <a:endParaRPr lang="pt-BR"/>
           </a:p>
@@ -2959,7 +2964,7 @@
           <a:p>
             <a:fld id="{9BF3D972-3798-48EA-BE69-B162682BAB0A}" type="datetimeFigureOut">
               <a:rPr lang="pt-BR" smtClean="0"/>
-              <a:t>25/04/2023</a:t>
+              <a:t>26/04/2023</a:t>
             </a:fld>
             <a:endParaRPr lang="pt-BR"/>
           </a:p>
@@ -3689,45 +3694,22 @@
             <p:ph type="ctrTitle"/>
           </p:nvPr>
         </p:nvSpPr>
-        <p:spPr/>
-        <p:txBody>
-          <a:bodyPr/>
-          <a:lstStyle/>
-          <a:p>
-            <a:r>
-              <a:rPr lang="pt-BR" dirty="0"/>
-              <a:t>Redes Neuras em Visão Computacional</a:t>
-            </a:r>
-          </a:p>
-        </p:txBody>
-      </p:sp>
-      <p:sp>
-        <p:nvSpPr>
-          <p:cNvPr id="3" name="Subtítulo 2">
-            <a:extLst>
-              <a:ext uri="{FF2B5EF4-FFF2-40B4-BE49-F238E27FC236}">
-                <a16:creationId xmlns:a16="http://schemas.microsoft.com/office/drawing/2014/main" id="{430F145A-B262-19EF-6664-41B2378BC5AB}"/>
-              </a:ext>
-            </a:extLst>
-          </p:cNvPr>
-          <p:cNvSpPr>
-            <a:spLocks noGrp="1"/>
-          </p:cNvSpPr>
-          <p:nvPr>
-            <p:ph type="subTitle" idx="4294967295"/>
-          </p:nvPr>
-        </p:nvSpPr>
         <p:spPr>
           <a:xfrm>
-            <a:off x="1524000" y="3602038"/>
-            <a:ext cx="9144000" cy="1655762"/>
+            <a:off x="1524000" y="1122362"/>
+            <a:ext cx="9144000" cy="2840037"/>
           </a:xfrm>
         </p:spPr>
         <p:txBody>
-          <a:bodyPr/>
+          <a:bodyPr>
+            <a:normAutofit/>
+          </a:bodyPr>
           <a:lstStyle/>
           <a:p>
-            <a:endParaRPr lang="pt-BR" dirty="0"/>
+            <a:r>
+              <a:rPr lang="pt-BR" sz="6600" dirty="0"/>
+              <a:t>Redes Neuras em Visão Computacional</a:t>
+            </a:r>
           </a:p>
         </p:txBody>
       </p:sp>
@@ -3797,8 +3779,8 @@
           </a:p>
         </p:txBody>
       </p:sp>
-      <mc:AlternateContent xmlns:mc="http://schemas.openxmlformats.org/markup-compatibility/2006">
-        <mc:Choice xmlns:a14="http://schemas.microsoft.com/office/drawing/2010/main" Requires="a14">
+      <mc:AlternateContent xmlns:mc="http://schemas.openxmlformats.org/markup-compatibility/2006" xmlns:a14="http://schemas.microsoft.com/office/drawing/2010/main">
+        <mc:Choice Requires="a14">
           <p:sp>
             <p:nvSpPr>
               <p:cNvPr id="3" name="Espaço Reservado para Conteúdo 2">
@@ -3890,13 +3872,7 @@
                         <a:rPr lang="pt-BR" b="0" i="1" smtClean="0">
                           <a:latin typeface="Cambria Math" panose="02040503050406030204" pitchFamily="18" charset="0"/>
                         </a:rPr>
-                        <m:t>+</m:t>
-                      </m:r>
-                      <m:r>
-                        <a:rPr lang="pt-BR" b="0" i="1" smtClean="0">
-                          <a:latin typeface="Cambria Math" panose="02040503050406030204" pitchFamily="18" charset="0"/>
-                        </a:rPr>
-                        <m:t>1 </m:t>
+                        <m:t>+1 </m:t>
                       </m:r>
                     </m:oMath>
                   </m:oMathPara>
@@ -4351,7 +4327,7 @@
             </p:txBody>
           </p:sp>
         </mc:Choice>
-        <mc:Fallback>
+        <mc:Fallback xmlns="">
           <p:sp>
             <p:nvSpPr>
               <p:cNvPr id="3" name="Espaço Reservado para Conteúdo 2">
@@ -4622,8 +4598,8 @@
           </a:p>
         </p:txBody>
       </p:sp>
-      <mc:AlternateContent xmlns:mc="http://schemas.openxmlformats.org/markup-compatibility/2006">
-        <mc:Choice xmlns:a14="http://schemas.microsoft.com/office/drawing/2010/main" Requires="a14">
+      <mc:AlternateContent xmlns:mc="http://schemas.openxmlformats.org/markup-compatibility/2006" xmlns:a14="http://schemas.microsoft.com/office/drawing/2010/main">
+        <mc:Choice Requires="a14">
           <p:sp>
             <p:nvSpPr>
               <p:cNvPr id="3" name="Espaço Reservado para Conteúdo 2">
@@ -5146,7 +5122,7 @@
             </p:txBody>
           </p:sp>
         </mc:Choice>
-        <mc:Fallback>
+        <mc:Fallback xmlns="">
           <p:sp>
             <p:nvSpPr>
               <p:cNvPr id="3" name="Espaço Reservado para Conteúdo 2">
@@ -5517,8 +5493,8 @@
           </a:p>
         </p:txBody>
       </p:sp>
-      <mc:AlternateContent xmlns:mc="http://schemas.openxmlformats.org/markup-compatibility/2006">
-        <mc:Choice xmlns:a14="http://schemas.microsoft.com/office/drawing/2010/main" Requires="a14">
+      <mc:AlternateContent xmlns:mc="http://schemas.openxmlformats.org/markup-compatibility/2006" xmlns:a14="http://schemas.microsoft.com/office/drawing/2010/main">
+        <mc:Choice Requires="a14">
           <p:sp>
             <p:nvSpPr>
               <p:cNvPr id="3" name="Espaço Reservado para Conteúdo 2">
@@ -6150,7 +6126,7 @@
             </p:txBody>
           </p:sp>
         </mc:Choice>
-        <mc:Fallback>
+        <mc:Fallback xmlns="">
           <p:sp>
             <p:nvSpPr>
               <p:cNvPr id="3" name="Espaço Reservado para Conteúdo 2">
@@ -6578,8 +6554,8 @@
         </p:blipFill>
         <p:spPr bwMode="auto">
           <a:xfrm>
-            <a:off x="10591800" y="4483100"/>
-            <a:ext cx="1524000" cy="1524000"/>
+            <a:off x="10525539" y="4681537"/>
+            <a:ext cx="1295400" cy="1295400"/>
           </a:xfrm>
           <a:prstGeom prst="rect">
             <a:avLst/>
@@ -7036,8 +7012,8 @@
         </p:blipFill>
         <p:spPr bwMode="auto">
           <a:xfrm>
-            <a:off x="9631018" y="4038600"/>
-            <a:ext cx="1871869" cy="1871869"/>
+            <a:off x="9882809" y="4369904"/>
+            <a:ext cx="1275521" cy="1275521"/>
           </a:xfrm>
           <a:prstGeom prst="rect">
             <a:avLst/>
@@ -7569,8 +7545,8 @@
         </p:blipFill>
         <p:spPr bwMode="auto">
           <a:xfrm>
-            <a:off x="10386392" y="4747281"/>
-            <a:ext cx="1564619" cy="1564619"/>
+            <a:off x="10505662" y="4874938"/>
+            <a:ext cx="1302025" cy="1302025"/>
           </a:xfrm>
           <a:prstGeom prst="rect">
             <a:avLst/>
@@ -8107,35 +8083,48 @@
         </p:nvSpPr>
         <p:spPr/>
         <p:txBody>
+          <a:bodyPr>
+            <a:normAutofit fontScale="90000"/>
+          </a:bodyPr>
+          <a:lstStyle/>
+          <a:p>
+            <a:r>
+              <a:rPr lang="pt-BR" dirty="0"/>
+              <a:t>Construção de uma rede </a:t>
+            </a:r>
+            <a:r>
+              <a:rPr lang="pt-BR" dirty="0" err="1"/>
+              <a:t>Convolucional</a:t>
+            </a:r>
+            <a:r>
+              <a:rPr lang="pt-BR" dirty="0"/>
+              <a:t> </a:t>
+            </a:r>
+          </a:p>
+        </p:txBody>
+      </p:sp>
+      <p:sp>
+        <p:nvSpPr>
+          <p:cNvPr id="3" name="Espaço Reservado para Conteúdo 2">
+            <a:extLst>
+              <a:ext uri="{FF2B5EF4-FFF2-40B4-BE49-F238E27FC236}">
+                <a16:creationId xmlns:a16="http://schemas.microsoft.com/office/drawing/2014/main" id="{75F0932E-0D05-5DF2-4F99-45C80EBDD612}"/>
+              </a:ext>
+            </a:extLst>
+          </p:cNvPr>
+          <p:cNvSpPr>
+            <a:spLocks noGrp="1"/>
+          </p:cNvSpPr>
+          <p:nvPr>
+            <p:ph idx="1"/>
+          </p:nvPr>
+        </p:nvSpPr>
+        <p:spPr/>
+        <p:txBody>
           <a:bodyPr/>
           <a:lstStyle/>
           <a:p>
-            <a:endParaRPr lang="pt-BR"/>
-          </a:p>
-        </p:txBody>
-      </p:sp>
-      <p:sp>
-        <p:nvSpPr>
-          <p:cNvPr id="3" name="Espaço Reservado para Conteúdo 2">
-            <a:extLst>
-              <a:ext uri="{FF2B5EF4-FFF2-40B4-BE49-F238E27FC236}">
-                <a16:creationId xmlns:a16="http://schemas.microsoft.com/office/drawing/2014/main" id="{75F0932E-0D05-5DF2-4F99-45C80EBDD612}"/>
-              </a:ext>
-            </a:extLst>
-          </p:cNvPr>
-          <p:cNvSpPr>
-            <a:spLocks noGrp="1"/>
-          </p:cNvSpPr>
-          <p:nvPr>
-            <p:ph idx="1"/>
-          </p:nvPr>
-        </p:nvSpPr>
-        <p:spPr/>
-        <p:txBody>
-          <a:bodyPr/>
-          <a:lstStyle/>
-          <a:p>
-            <a:endParaRPr lang="pt-BR"/>
+            <a:endParaRPr lang="pt-BR" dirty="0"/>
           </a:p>
         </p:txBody>
       </p:sp>
@@ -9339,7 +9328,7 @@
         </p:blipFill>
         <p:spPr bwMode="auto">
           <a:xfrm>
-            <a:off x="5965371" y="1374556"/>
+            <a:off x="5807075" y="1299151"/>
             <a:ext cx="6384925" cy="4108887"/>
           </a:xfrm>
           <a:prstGeom prst="rect">
@@ -9386,8 +9375,8 @@
         </p:blipFill>
         <p:spPr bwMode="auto">
           <a:xfrm>
-            <a:off x="5410200" y="4940300"/>
-            <a:ext cx="1371600" cy="1371600"/>
+            <a:off x="5573367" y="5233067"/>
+            <a:ext cx="1045265" cy="1045265"/>
           </a:xfrm>
           <a:prstGeom prst="rect">
             <a:avLst/>

</xml_diff>

<commit_message>
preparado uma parte do dataset
</commit_message>
<xml_diff>
--- a/docs/Redes Neuras em Visão Computacional.pptx
+++ b/docs/Redes Neuras em Visão Computacional.pptx
@@ -29,7 +29,14 @@
     <p:sldId id="278" r:id="rId23"/>
     <p:sldId id="279" r:id="rId24"/>
     <p:sldId id="281" r:id="rId25"/>
-    <p:sldId id="276" r:id="rId26"/>
+    <p:sldId id="282" r:id="rId26"/>
+    <p:sldId id="283" r:id="rId27"/>
+    <p:sldId id="285" r:id="rId28"/>
+    <p:sldId id="284" r:id="rId29"/>
+    <p:sldId id="286" r:id="rId30"/>
+    <p:sldId id="287" r:id="rId31"/>
+    <p:sldId id="288" r:id="rId32"/>
+    <p:sldId id="276" r:id="rId33"/>
   </p:sldIdLst>
   <p:sldSz cx="12192000" cy="6858000"/>
   <p:notesSz cx="6858000" cy="9144000"/>
@@ -134,6 +141,18 @@
     </p:ext>
   </p:extLst>
 </p:presentation>
+</file>
+
+<file path=ppt/commentAuthors.xml><?xml version="1.0" encoding="utf-8"?>
+<p:cmAuthorLst xmlns:a="http://schemas.openxmlformats.org/drawingml/2006/main" xmlns:r="http://schemas.openxmlformats.org/officeDocument/2006/relationships" xmlns:p="http://schemas.openxmlformats.org/presentationml/2006/main">
+  <p:cmAuthor id="1" name="Crazy NDS" initials="CN" lastIdx="1" clrIdx="0">
+    <p:extLst>
+      <p:ext uri="{19B8F6BF-5375-455C-9EA6-DF929625EA0E}">
+        <p15:presenceInfo xmlns:p15="http://schemas.microsoft.com/office/powerpoint/2012/main" userId="b3c469f9d0cc45d2" providerId="Windows Live"/>
+      </p:ext>
+    </p:extLst>
+  </p:cmAuthor>
+</p:cmAuthorLst>
 </file>
 
 <file path=ppt/slideLayouts/slideLayout1.xml><?xml version="1.0" encoding="utf-8"?>
@@ -7104,7 +7123,12 @@
             <p:ph sz="half" idx="1"/>
           </p:nvPr>
         </p:nvSpPr>
-        <p:spPr/>
+        <p:spPr>
+          <a:xfrm>
+            <a:off x="838200" y="1825625"/>
+            <a:ext cx="5181600" cy="4351338"/>
+          </a:xfrm>
+        </p:spPr>
         <p:txBody>
           <a:bodyPr>
             <a:normAutofit/>
@@ -7480,7 +7504,7 @@
           <a:p>
             <a:r>
               <a:rPr lang="pt-BR" dirty="0"/>
-              <a:t>Apresenta as mesmas características de campo de percepção;</a:t>
+              <a:t>Cada neurónio também tem seu campo de percepção;</a:t>
             </a:r>
           </a:p>
           <a:p>
@@ -7499,6 +7523,10 @@
               <a:rPr lang="pt-BR" dirty="0"/>
               <a:t>. Max, Min, Sum</a:t>
             </a:r>
+          </a:p>
+          <a:p>
+            <a:pPr lvl="1"/>
+            <a:endParaRPr lang="pt-BR" dirty="0"/>
           </a:p>
           <a:p>
             <a:pPr lvl="1"/>
@@ -8124,7 +8152,10 @@
           <a:bodyPr/>
           <a:lstStyle/>
           <a:p>
-            <a:endParaRPr lang="pt-BR" dirty="0"/>
+            <a:r>
+              <a:rPr lang="pt-BR" dirty="0"/>
+              <a:t>(Aqui vai um slide mais voltado para a construção de uma rede dessas. Talvez envolva código?? Quem sabe...)</a:t>
+            </a:r>
           </a:p>
         </p:txBody>
       </p:sp>
@@ -8163,7 +8194,7 @@
           <p:cNvPr id="2" name="Título 1">
             <a:extLst>
               <a:ext uri="{FF2B5EF4-FFF2-40B4-BE49-F238E27FC236}">
-                <a16:creationId xmlns:a16="http://schemas.microsoft.com/office/drawing/2014/main" id="{2386AFF4-5EA8-2DC4-ACF6-93599C913C54}"/>
+                <a16:creationId xmlns:a16="http://schemas.microsoft.com/office/drawing/2014/main" id="{FAB2F2A1-0398-9B44-7253-A7812EA6283F}"/>
               </a:ext>
             </a:extLst>
           </p:cNvPr>
@@ -8180,12 +8211,8 @@
           <a:lstStyle/>
           <a:p>
             <a:r>
-              <a:rPr lang="pt-BR" dirty="0" err="1"/>
-              <a:t>Implementãção</a:t>
-            </a:r>
-            <a:r>
-              <a:rPr lang="pt-BR" dirty="0"/>
-              <a:t>?</a:t>
+              <a:rPr lang="pt-BR" dirty="0"/>
+              <a:t>Construindo a saída</a:t>
             </a:r>
           </a:p>
         </p:txBody>
@@ -8195,7 +8222,7 @@
           <p:cNvPr id="3" name="Espaço Reservado para Conteúdo 2">
             <a:extLst>
               <a:ext uri="{FF2B5EF4-FFF2-40B4-BE49-F238E27FC236}">
-                <a16:creationId xmlns:a16="http://schemas.microsoft.com/office/drawing/2014/main" id="{E3117AAB-C42E-2863-9F6F-82F775BA3BD0}"/>
+                <a16:creationId xmlns:a16="http://schemas.microsoft.com/office/drawing/2014/main" id="{6B19DAEB-E128-A34D-B103-6000F7722DC2}"/>
               </a:ext>
             </a:extLst>
           </p:cNvPr>
@@ -8213,15 +8240,695 @@
           <a:p>
             <a:r>
               <a:rPr lang="pt-BR" dirty="0"/>
-              <a:t>Sei não....</a:t>
-            </a:r>
-          </a:p>
-        </p:txBody>
-      </p:sp>
+              <a:t>A saída de uma rede pode variar entre:</a:t>
+            </a:r>
+          </a:p>
+          <a:p>
+            <a:pPr lvl="1"/>
+            <a:r>
+              <a:rPr lang="pt-BR" dirty="0"/>
+              <a:t>Classificação;</a:t>
+            </a:r>
+          </a:p>
+          <a:p>
+            <a:pPr lvl="1"/>
+            <a:r>
+              <a:rPr lang="pt-BR" dirty="0"/>
+              <a:t>Localização;</a:t>
+            </a:r>
+          </a:p>
+          <a:p>
+            <a:pPr lvl="1"/>
+            <a:r>
+              <a:rPr lang="pt-BR" dirty="0"/>
+              <a:t>Detecção de Objetos; </a:t>
+            </a:r>
+          </a:p>
+          <a:p>
+            <a:pPr lvl="1"/>
+            <a:r>
+              <a:rPr lang="pt-BR" dirty="0"/>
+              <a:t>Segmentação;</a:t>
+            </a:r>
+          </a:p>
+          <a:p>
+            <a:pPr lvl="1"/>
+            <a:endParaRPr lang="pt-BR" dirty="0"/>
+          </a:p>
+          <a:p>
+            <a:pPr lvl="1"/>
+            <a:endParaRPr lang="pt-BR" dirty="0"/>
+          </a:p>
+        </p:txBody>
+      </p:sp>
+      <p:pic>
+        <p:nvPicPr>
+          <p:cNvPr id="6" name="Imagem 5">
+            <a:extLst>
+              <a:ext uri="{FF2B5EF4-FFF2-40B4-BE49-F238E27FC236}">
+                <a16:creationId xmlns:a16="http://schemas.microsoft.com/office/drawing/2014/main" id="{89EF80A6-F016-02F5-0BF9-163191E5BDB0}"/>
+              </a:ext>
+            </a:extLst>
+          </p:cNvPr>
+          <p:cNvPicPr>
+            <a:picLocks noChangeAspect="1"/>
+          </p:cNvPicPr>
+          <p:nvPr/>
+        </p:nvPicPr>
+        <p:blipFill rotWithShape="1">
+          <a:blip r:embed="rId2">
+            <a:extLst>
+              <a:ext uri="{28A0092B-C50C-407E-A947-70E740481C1C}">
+                <a14:useLocalDpi xmlns:a14="http://schemas.microsoft.com/office/drawing/2010/main" val="0"/>
+              </a:ext>
+            </a:extLst>
+          </a:blip>
+          <a:srcRect l="1244" t="6366" r="1966" b="58113"/>
+          <a:stretch/>
+        </p:blipFill>
+        <p:spPr>
+          <a:xfrm>
+            <a:off x="1842051" y="4536799"/>
+            <a:ext cx="8273515" cy="1775101"/>
+          </a:xfrm>
+          <a:prstGeom prst="rect">
+            <a:avLst/>
+          </a:prstGeom>
+        </p:spPr>
+      </p:pic>
     </p:spTree>
     <p:extLst>
       <p:ext uri="{BB962C8B-B14F-4D97-AF65-F5344CB8AC3E}">
-        <p14:creationId xmlns:p14="http://schemas.microsoft.com/office/powerpoint/2010/main" val="3722881240"/>
+        <p14:creationId xmlns:p14="http://schemas.microsoft.com/office/powerpoint/2010/main" val="3608804312"/>
+      </p:ext>
+    </p:extLst>
+  </p:cSld>
+  <p:clrMapOvr>
+    <a:masterClrMapping/>
+  </p:clrMapOvr>
+</p:sld>
+</file>
+
+<file path=ppt/slides/slide26.xml><?xml version="1.0" encoding="utf-8"?>
+<p:sld xmlns:a="http://schemas.openxmlformats.org/drawingml/2006/main" xmlns:r="http://schemas.openxmlformats.org/officeDocument/2006/relationships" xmlns:p="http://schemas.openxmlformats.org/presentationml/2006/main">
+  <p:cSld>
+    <p:spTree>
+      <p:nvGrpSpPr>
+        <p:cNvPr id="1" name=""/>
+        <p:cNvGrpSpPr/>
+        <p:nvPr/>
+      </p:nvGrpSpPr>
+      <p:grpSpPr>
+        <a:xfrm>
+          <a:off x="0" y="0"/>
+          <a:ext cx="0" cy="0"/>
+          <a:chOff x="0" y="0"/>
+          <a:chExt cx="0" cy="0"/>
+        </a:xfrm>
+      </p:grpSpPr>
+      <p:sp>
+        <p:nvSpPr>
+          <p:cNvPr id="2" name="Título 1">
+            <a:extLst>
+              <a:ext uri="{FF2B5EF4-FFF2-40B4-BE49-F238E27FC236}">
+                <a16:creationId xmlns:a16="http://schemas.microsoft.com/office/drawing/2014/main" id="{8D208B07-0EF9-44FC-D2A4-086742C04113}"/>
+              </a:ext>
+            </a:extLst>
+          </p:cNvPr>
+          <p:cNvSpPr>
+            <a:spLocks noGrp="1"/>
+          </p:cNvSpPr>
+          <p:nvPr>
+            <p:ph type="title"/>
+          </p:nvPr>
+        </p:nvSpPr>
+        <p:spPr/>
+        <p:txBody>
+          <a:bodyPr/>
+          <a:lstStyle/>
+          <a:p>
+            <a:r>
+              <a:rPr lang="pt-BR" dirty="0"/>
+              <a:t>Classificação e Localização</a:t>
+            </a:r>
+          </a:p>
+        </p:txBody>
+      </p:sp>
+      <p:sp>
+        <p:nvSpPr>
+          <p:cNvPr id="3" name="Espaço Reservado para Conteúdo 2">
+            <a:extLst>
+              <a:ext uri="{FF2B5EF4-FFF2-40B4-BE49-F238E27FC236}">
+                <a16:creationId xmlns:a16="http://schemas.microsoft.com/office/drawing/2014/main" id="{83EB8A91-37E6-0396-CA89-1F49D0B57BB5}"/>
+              </a:ext>
+            </a:extLst>
+          </p:cNvPr>
+          <p:cNvSpPr>
+            <a:spLocks noGrp="1"/>
+          </p:cNvSpPr>
+          <p:nvPr>
+            <p:ph idx="1"/>
+          </p:nvPr>
+        </p:nvSpPr>
+        <p:spPr/>
+        <p:txBody>
+          <a:bodyPr/>
+          <a:lstStyle/>
+          <a:p>
+            <a:r>
+              <a:rPr lang="pt-BR" dirty="0"/>
+              <a:t>As ultimas camadas são uma rede neural totalmente conectada;</a:t>
+            </a:r>
+          </a:p>
+          <a:p>
+            <a:r>
+              <a:rPr lang="pt-BR" dirty="0"/>
+              <a:t>Classificação:</a:t>
+            </a:r>
+          </a:p>
+          <a:p>
+            <a:pPr lvl="1"/>
+            <a:r>
+              <a:rPr lang="pt-BR" dirty="0"/>
+              <a:t>Função </a:t>
+            </a:r>
+            <a:r>
+              <a:rPr lang="pt-BR" dirty="0" err="1"/>
+              <a:t>softmax</a:t>
+            </a:r>
+            <a:r>
+              <a:rPr lang="pt-BR" dirty="0"/>
+              <a:t>;</a:t>
+            </a:r>
+          </a:p>
+          <a:p>
+            <a:pPr lvl="1"/>
+            <a:r>
+              <a:rPr lang="pt-BR" dirty="0"/>
+              <a:t>Cada neurônio de saída representa sim ou não;</a:t>
+            </a:r>
+          </a:p>
+          <a:p>
+            <a:r>
+              <a:rPr lang="pt-BR" dirty="0"/>
+              <a:t>Localização:</a:t>
+            </a:r>
+          </a:p>
+          <a:p>
+            <a:pPr lvl="1"/>
+            <a:r>
+              <a:rPr lang="pt-BR" dirty="0"/>
+              <a:t>Valor entre 0 e 1;</a:t>
+            </a:r>
+          </a:p>
+          <a:p>
+            <a:pPr lvl="1"/>
+            <a:r>
+              <a:rPr lang="pt-BR" dirty="0"/>
+              <a:t>Cada neurônio de saída representa um eixo na posição do objeto detectado;</a:t>
+            </a:r>
+          </a:p>
+          <a:p>
+            <a:pPr lvl="1"/>
+            <a:endParaRPr lang="pt-BR" dirty="0"/>
+          </a:p>
+        </p:txBody>
+      </p:sp>
+    </p:spTree>
+    <p:extLst>
+      <p:ext uri="{BB962C8B-B14F-4D97-AF65-F5344CB8AC3E}">
+        <p14:creationId xmlns:p14="http://schemas.microsoft.com/office/powerpoint/2010/main" val="954013180"/>
+      </p:ext>
+    </p:extLst>
+  </p:cSld>
+  <p:clrMapOvr>
+    <a:masterClrMapping/>
+  </p:clrMapOvr>
+</p:sld>
+</file>
+
+<file path=ppt/slides/slide27.xml><?xml version="1.0" encoding="utf-8"?>
+<p:sld xmlns:a="http://schemas.openxmlformats.org/drawingml/2006/main" xmlns:r="http://schemas.openxmlformats.org/officeDocument/2006/relationships" xmlns:p="http://schemas.openxmlformats.org/presentationml/2006/main">
+  <p:cSld>
+    <p:spTree>
+      <p:nvGrpSpPr>
+        <p:cNvPr id="1" name=""/>
+        <p:cNvGrpSpPr/>
+        <p:nvPr/>
+      </p:nvGrpSpPr>
+      <p:grpSpPr>
+        <a:xfrm>
+          <a:off x="0" y="0"/>
+          <a:ext cx="0" cy="0"/>
+          <a:chOff x="0" y="0"/>
+          <a:chExt cx="0" cy="0"/>
+        </a:xfrm>
+      </p:grpSpPr>
+      <p:sp>
+        <p:nvSpPr>
+          <p:cNvPr id="2" name="Título 1">
+            <a:extLst>
+              <a:ext uri="{FF2B5EF4-FFF2-40B4-BE49-F238E27FC236}">
+                <a16:creationId xmlns:a16="http://schemas.microsoft.com/office/drawing/2014/main" id="{8F81D8B6-3D10-8297-1CED-C7564EA6980A}"/>
+              </a:ext>
+            </a:extLst>
+          </p:cNvPr>
+          <p:cNvSpPr>
+            <a:spLocks noGrp="1"/>
+          </p:cNvSpPr>
+          <p:nvPr>
+            <p:ph type="title"/>
+          </p:nvPr>
+        </p:nvSpPr>
+        <p:spPr/>
+        <p:txBody>
+          <a:bodyPr/>
+          <a:lstStyle/>
+          <a:p>
+            <a:r>
+              <a:rPr lang="pt-BR" dirty="0"/>
+              <a:t>Classificação e Localização</a:t>
+            </a:r>
+          </a:p>
+        </p:txBody>
+      </p:sp>
+      <p:sp>
+        <p:nvSpPr>
+          <p:cNvPr id="3" name="Espaço Reservado para Conteúdo 2">
+            <a:extLst>
+              <a:ext uri="{FF2B5EF4-FFF2-40B4-BE49-F238E27FC236}">
+                <a16:creationId xmlns:a16="http://schemas.microsoft.com/office/drawing/2014/main" id="{066D45E9-5758-BE7F-9334-8EDF67ABAE3F}"/>
+              </a:ext>
+            </a:extLst>
+          </p:cNvPr>
+          <p:cNvSpPr>
+            <a:spLocks noGrp="1"/>
+          </p:cNvSpPr>
+          <p:nvPr>
+            <p:ph idx="1"/>
+          </p:nvPr>
+        </p:nvSpPr>
+        <p:spPr/>
+        <p:txBody>
+          <a:bodyPr/>
+          <a:lstStyle/>
+          <a:p>
+            <a:r>
+              <a:rPr lang="pt-BR" dirty="0"/>
+              <a:t>Número fixo de neurônios de saída;</a:t>
+            </a:r>
+          </a:p>
+          <a:p>
+            <a:pPr lvl="1"/>
+            <a:r>
+              <a:rPr lang="pt-BR" dirty="0"/>
+              <a:t>Problemas para detectar mais de um objeto;</a:t>
+            </a:r>
+          </a:p>
+          <a:p>
+            <a:pPr lvl="1"/>
+            <a:endParaRPr lang="pt-BR" dirty="0"/>
+          </a:p>
+          <a:p>
+            <a:pPr lvl="1"/>
+            <a:endParaRPr lang="pt-BR" dirty="0"/>
+          </a:p>
+          <a:p>
+            <a:r>
+              <a:rPr lang="pt-BR" dirty="0"/>
+              <a:t>Precisa que os dados de treinamento já </a:t>
+            </a:r>
+            <a:br>
+              <a:rPr lang="pt-BR" dirty="0"/>
+            </a:br>
+            <a:r>
+              <a:rPr lang="pt-BR" dirty="0"/>
+              <a:t>estejam classificados ou localizados;</a:t>
+            </a:r>
+          </a:p>
+          <a:p>
+            <a:endParaRPr lang="pt-BR" dirty="0"/>
+          </a:p>
+        </p:txBody>
+      </p:sp>
+      <p:pic>
+        <p:nvPicPr>
+          <p:cNvPr id="5" name="Imagem 4">
+            <a:extLst>
+              <a:ext uri="{FF2B5EF4-FFF2-40B4-BE49-F238E27FC236}">
+                <a16:creationId xmlns:a16="http://schemas.microsoft.com/office/drawing/2014/main" id="{BECEA777-99BE-82D1-7D5B-0E5CD5E1A6F9}"/>
+              </a:ext>
+            </a:extLst>
+          </p:cNvPr>
+          <p:cNvPicPr>
+            <a:picLocks noChangeAspect="1"/>
+          </p:cNvPicPr>
+          <p:nvPr/>
+        </p:nvPicPr>
+        <p:blipFill>
+          <a:blip r:embed="rId2"/>
+          <a:stretch>
+            <a:fillRect/>
+          </a:stretch>
+        </p:blipFill>
+        <p:spPr>
+          <a:xfrm>
+            <a:off x="8108052" y="2597013"/>
+            <a:ext cx="4083948" cy="2808562"/>
+          </a:xfrm>
+          <a:prstGeom prst="rect">
+            <a:avLst/>
+          </a:prstGeom>
+        </p:spPr>
+      </p:pic>
+    </p:spTree>
+    <p:extLst>
+      <p:ext uri="{BB962C8B-B14F-4D97-AF65-F5344CB8AC3E}">
+        <p14:creationId xmlns:p14="http://schemas.microsoft.com/office/powerpoint/2010/main" val="1559023666"/>
+      </p:ext>
+    </p:extLst>
+  </p:cSld>
+  <p:clrMapOvr>
+    <a:masterClrMapping/>
+  </p:clrMapOvr>
+</p:sld>
+</file>
+
+<file path=ppt/slides/slide28.xml><?xml version="1.0" encoding="utf-8"?>
+<p:sld xmlns:a="http://schemas.openxmlformats.org/drawingml/2006/main" xmlns:r="http://schemas.openxmlformats.org/officeDocument/2006/relationships" xmlns:p="http://schemas.openxmlformats.org/presentationml/2006/main">
+  <p:cSld>
+    <p:spTree>
+      <p:nvGrpSpPr>
+        <p:cNvPr id="1" name=""/>
+        <p:cNvGrpSpPr/>
+        <p:nvPr/>
+      </p:nvGrpSpPr>
+      <p:grpSpPr>
+        <a:xfrm>
+          <a:off x="0" y="0"/>
+          <a:ext cx="0" cy="0"/>
+          <a:chOff x="0" y="0"/>
+          <a:chExt cx="0" cy="0"/>
+        </a:xfrm>
+      </p:grpSpPr>
+      <p:sp>
+        <p:nvSpPr>
+          <p:cNvPr id="2" name="Título 1">
+            <a:extLst>
+              <a:ext uri="{FF2B5EF4-FFF2-40B4-BE49-F238E27FC236}">
+                <a16:creationId xmlns:a16="http://schemas.microsoft.com/office/drawing/2014/main" id="{A967FC8A-99EE-5F6D-21D2-A4B88A894A2E}"/>
+              </a:ext>
+            </a:extLst>
+          </p:cNvPr>
+          <p:cNvSpPr>
+            <a:spLocks noGrp="1"/>
+          </p:cNvSpPr>
+          <p:nvPr>
+            <p:ph type="title"/>
+          </p:nvPr>
+        </p:nvSpPr>
+        <p:spPr/>
+        <p:txBody>
+          <a:bodyPr/>
+          <a:lstStyle/>
+          <a:p>
+            <a:r>
+              <a:rPr lang="pt-BR" dirty="0"/>
+              <a:t>Detecção de Objetos</a:t>
+            </a:r>
+          </a:p>
+        </p:txBody>
+      </p:sp>
+      <p:sp>
+        <p:nvSpPr>
+          <p:cNvPr id="3" name="Espaço Reservado para Conteúdo 2">
+            <a:extLst>
+              <a:ext uri="{FF2B5EF4-FFF2-40B4-BE49-F238E27FC236}">
+                <a16:creationId xmlns:a16="http://schemas.microsoft.com/office/drawing/2014/main" id="{09BBEFCF-A401-66D9-39E4-DDAA14605376}"/>
+              </a:ext>
+            </a:extLst>
+          </p:cNvPr>
+          <p:cNvSpPr>
+            <a:spLocks noGrp="1"/>
+          </p:cNvSpPr>
+          <p:nvPr>
+            <p:ph idx="1"/>
+          </p:nvPr>
+        </p:nvSpPr>
+        <p:spPr/>
+        <p:txBody>
+          <a:bodyPr>
+            <a:normAutofit lnSpcReduction="10000"/>
+          </a:bodyPr>
+          <a:lstStyle/>
+          <a:p>
+            <a:r>
+              <a:rPr lang="pt-BR" dirty="0"/>
+              <a:t>Método simples:</a:t>
+            </a:r>
+          </a:p>
+          <a:p>
+            <a:pPr lvl="1"/>
+            <a:r>
+              <a:rPr lang="pt-BR" dirty="0"/>
+              <a:t>Dividir a imagem principal;</a:t>
+            </a:r>
+          </a:p>
+          <a:p>
+            <a:pPr lvl="1"/>
+            <a:r>
+              <a:rPr lang="pt-BR" dirty="0"/>
+              <a:t>Testar a classificação e localização de </a:t>
+            </a:r>
+            <a:br>
+              <a:rPr lang="pt-BR" dirty="0"/>
+            </a:br>
+            <a:r>
+              <a:rPr lang="pt-BR" dirty="0"/>
+              <a:t>cada parte;</a:t>
+            </a:r>
+          </a:p>
+          <a:p>
+            <a:r>
+              <a:rPr lang="pt-BR" dirty="0"/>
+              <a:t>Lista de todas as localizações;</a:t>
+            </a:r>
+          </a:p>
+          <a:p>
+            <a:pPr marL="0" indent="0">
+              <a:buNone/>
+            </a:pPr>
+            <a:endParaRPr lang="pt-BR" dirty="0"/>
+          </a:p>
+          <a:p>
+            <a:r>
+              <a:rPr lang="pt-BR" dirty="0"/>
+              <a:t>Desvantagens:</a:t>
+            </a:r>
+          </a:p>
+          <a:p>
+            <a:pPr lvl="1"/>
+            <a:r>
+              <a:rPr lang="pt-BR" dirty="0"/>
+              <a:t>Não existe tamanho padrão;</a:t>
+            </a:r>
+          </a:p>
+          <a:p>
+            <a:pPr lvl="1"/>
+            <a:r>
+              <a:rPr lang="pt-BR" dirty="0"/>
+              <a:t>Reprocessamento;</a:t>
+            </a:r>
+          </a:p>
+          <a:p>
+            <a:pPr lvl="1"/>
+            <a:r>
+              <a:rPr lang="pt-BR" dirty="0"/>
+              <a:t>Dois objetos no mesmo pedaço;</a:t>
+            </a:r>
+          </a:p>
+          <a:p>
+            <a:pPr lvl="1"/>
+            <a:r>
+              <a:rPr lang="pt-BR" dirty="0"/>
+              <a:t>Pode detectar o mesmo objeto;</a:t>
+            </a:r>
+          </a:p>
+        </p:txBody>
+      </p:sp>
+      <p:pic>
+        <p:nvPicPr>
+          <p:cNvPr id="2050" name="Picture 2" descr="Object Detection—ArcGIS Pro | Documentation">
+            <a:extLst>
+              <a:ext uri="{FF2B5EF4-FFF2-40B4-BE49-F238E27FC236}">
+                <a16:creationId xmlns:a16="http://schemas.microsoft.com/office/drawing/2014/main" id="{5AC794E1-E425-825E-4C03-BCDF51FFF039}"/>
+              </a:ext>
+            </a:extLst>
+          </p:cNvPr>
+          <p:cNvPicPr>
+            <a:picLocks noChangeAspect="1" noChangeArrowheads="1"/>
+          </p:cNvPicPr>
+          <p:nvPr/>
+        </p:nvPicPr>
+        <p:blipFill>
+          <a:blip r:embed="rId2">
+            <a:extLst>
+              <a:ext uri="{28A0092B-C50C-407E-A947-70E740481C1C}">
+                <a14:useLocalDpi xmlns:a14="http://schemas.microsoft.com/office/drawing/2010/main" val="0"/>
+              </a:ext>
+            </a:extLst>
+          </a:blip>
+          <a:srcRect/>
+          <a:stretch>
+            <a:fillRect/>
+          </a:stretch>
+        </p:blipFill>
+        <p:spPr bwMode="auto">
+          <a:xfrm>
+            <a:off x="8029575" y="824706"/>
+            <a:ext cx="3857625" cy="3544399"/>
+          </a:xfrm>
+          <a:prstGeom prst="rect">
+            <a:avLst/>
+          </a:prstGeom>
+          <a:noFill/>
+          <a:extLst>
+            <a:ext uri="{909E8E84-426E-40DD-AFC4-6F175D3DCCD1}">
+              <a14:hiddenFill xmlns:a14="http://schemas.microsoft.com/office/drawing/2010/main">
+                <a:solidFill>
+                  <a:srgbClr val="FFFFFF"/>
+                </a:solidFill>
+              </a14:hiddenFill>
+            </a:ext>
+          </a:extLst>
+        </p:spPr>
+      </p:pic>
+    </p:spTree>
+    <p:extLst>
+      <p:ext uri="{BB962C8B-B14F-4D97-AF65-F5344CB8AC3E}">
+        <p14:creationId xmlns:p14="http://schemas.microsoft.com/office/powerpoint/2010/main" val="4018840545"/>
+      </p:ext>
+    </p:extLst>
+  </p:cSld>
+  <p:clrMapOvr>
+    <a:masterClrMapping/>
+  </p:clrMapOvr>
+</p:sld>
+</file>
+
+<file path=ppt/slides/slide29.xml><?xml version="1.0" encoding="utf-8"?>
+<p:sld xmlns:a="http://schemas.openxmlformats.org/drawingml/2006/main" xmlns:r="http://schemas.openxmlformats.org/officeDocument/2006/relationships" xmlns:p="http://schemas.openxmlformats.org/presentationml/2006/main">
+  <p:cSld>
+    <p:spTree>
+      <p:nvGrpSpPr>
+        <p:cNvPr id="1" name=""/>
+        <p:cNvGrpSpPr/>
+        <p:nvPr/>
+      </p:nvGrpSpPr>
+      <p:grpSpPr>
+        <a:xfrm>
+          <a:off x="0" y="0"/>
+          <a:ext cx="0" cy="0"/>
+          <a:chOff x="0" y="0"/>
+          <a:chExt cx="0" cy="0"/>
+        </a:xfrm>
+      </p:grpSpPr>
+      <p:sp>
+        <p:nvSpPr>
+          <p:cNvPr id="2" name="Título 1">
+            <a:extLst>
+              <a:ext uri="{FF2B5EF4-FFF2-40B4-BE49-F238E27FC236}">
+                <a16:creationId xmlns:a16="http://schemas.microsoft.com/office/drawing/2014/main" id="{406F366F-9522-6053-B4DB-30B6956E7488}"/>
+              </a:ext>
+            </a:extLst>
+          </p:cNvPr>
+          <p:cNvSpPr>
+            <a:spLocks noGrp="1"/>
+          </p:cNvSpPr>
+          <p:nvPr>
+            <p:ph type="title"/>
+          </p:nvPr>
+        </p:nvSpPr>
+        <p:spPr/>
+        <p:txBody>
+          <a:bodyPr/>
+          <a:lstStyle/>
+          <a:p>
+            <a:r>
+              <a:rPr lang="pt-BR" dirty="0"/>
+              <a:t>Rede Totalmente </a:t>
+            </a:r>
+            <a:r>
+              <a:rPr lang="pt-BR" dirty="0" err="1"/>
+              <a:t>Convolucional</a:t>
+            </a:r>
+            <a:endParaRPr lang="pt-BR" dirty="0"/>
+          </a:p>
+        </p:txBody>
+      </p:sp>
+      <p:sp>
+        <p:nvSpPr>
+          <p:cNvPr id="3" name="Espaço Reservado para Conteúdo 2">
+            <a:extLst>
+              <a:ext uri="{FF2B5EF4-FFF2-40B4-BE49-F238E27FC236}">
+                <a16:creationId xmlns:a16="http://schemas.microsoft.com/office/drawing/2014/main" id="{F6AACCBA-1516-061B-6713-50B7BE4E29C8}"/>
+              </a:ext>
+            </a:extLst>
+          </p:cNvPr>
+          <p:cNvSpPr>
+            <a:spLocks noGrp="1"/>
+          </p:cNvSpPr>
+          <p:nvPr>
+            <p:ph idx="1"/>
+          </p:nvPr>
+        </p:nvSpPr>
+        <p:spPr/>
+        <p:txBody>
+          <a:bodyPr/>
+          <a:lstStyle/>
+          <a:p>
+            <a:endParaRPr lang="pt-BR" dirty="0"/>
+          </a:p>
+          <a:p>
+            <a:r>
+              <a:rPr lang="pt-BR" dirty="0"/>
+              <a:t>Substituir a rede totalmente conectada:</a:t>
+            </a:r>
+          </a:p>
+          <a:p>
+            <a:pPr lvl="1"/>
+            <a:r>
+              <a:rPr lang="pt-BR" dirty="0"/>
+              <a:t>Imagens de qualquer tamanho podem ser carregadas;</a:t>
+            </a:r>
+          </a:p>
+          <a:p>
+            <a:pPr lvl="2"/>
+            <a:r>
+              <a:rPr lang="pt-BR" dirty="0"/>
+              <a:t>Imagens maiores resultam saídas maiores;</a:t>
+            </a:r>
+          </a:p>
+          <a:p>
+            <a:pPr lvl="1"/>
+            <a:r>
+              <a:rPr lang="pt-BR" dirty="0"/>
+              <a:t>CNN podem ser convertidas em FCN;</a:t>
+            </a:r>
+          </a:p>
+          <a:p>
+            <a:pPr lvl="1"/>
+            <a:endParaRPr lang="pt-BR" dirty="0"/>
+          </a:p>
+          <a:p>
+            <a:endParaRPr lang="pt-BR" dirty="0"/>
+          </a:p>
+        </p:txBody>
+      </p:sp>
+    </p:spTree>
+    <p:extLst>
+      <p:ext uri="{BB962C8B-B14F-4D97-AF65-F5344CB8AC3E}">
+        <p14:creationId xmlns:p14="http://schemas.microsoft.com/office/powerpoint/2010/main" val="2156144129"/>
       </p:ext>
     </p:extLst>
   </p:cSld>
@@ -8356,6 +9063,421 @@
     <p:extLst>
       <p:ext uri="{BB962C8B-B14F-4D97-AF65-F5344CB8AC3E}">
         <p14:creationId xmlns:p14="http://schemas.microsoft.com/office/powerpoint/2010/main" val="1471231250"/>
+      </p:ext>
+    </p:extLst>
+  </p:cSld>
+  <p:clrMapOvr>
+    <a:masterClrMapping/>
+  </p:clrMapOvr>
+</p:sld>
+</file>
+
+<file path=ppt/slides/slide30.xml><?xml version="1.0" encoding="utf-8"?>
+<p:sld xmlns:a="http://schemas.openxmlformats.org/drawingml/2006/main" xmlns:r="http://schemas.openxmlformats.org/officeDocument/2006/relationships" xmlns:p="http://schemas.openxmlformats.org/presentationml/2006/main">
+  <p:cSld>
+    <p:spTree>
+      <p:nvGrpSpPr>
+        <p:cNvPr id="1" name=""/>
+        <p:cNvGrpSpPr/>
+        <p:nvPr/>
+      </p:nvGrpSpPr>
+      <p:grpSpPr>
+        <a:xfrm>
+          <a:off x="0" y="0"/>
+          <a:ext cx="0" cy="0"/>
+          <a:chOff x="0" y="0"/>
+          <a:chExt cx="0" cy="0"/>
+        </a:xfrm>
+      </p:grpSpPr>
+      <p:sp>
+        <p:nvSpPr>
+          <p:cNvPr id="2" name="Título 1">
+            <a:extLst>
+              <a:ext uri="{FF2B5EF4-FFF2-40B4-BE49-F238E27FC236}">
+                <a16:creationId xmlns:a16="http://schemas.microsoft.com/office/drawing/2014/main" id="{B3060DB7-7AF6-2421-056F-3DE8CE870F1D}"/>
+              </a:ext>
+            </a:extLst>
+          </p:cNvPr>
+          <p:cNvSpPr>
+            <a:spLocks noGrp="1"/>
+          </p:cNvSpPr>
+          <p:nvPr>
+            <p:ph type="title"/>
+          </p:nvPr>
+        </p:nvSpPr>
+        <p:spPr/>
+        <p:txBody>
+          <a:bodyPr/>
+          <a:lstStyle/>
+          <a:p>
+            <a:r>
+              <a:rPr lang="pt-BR" dirty="0"/>
+              <a:t>Rede Totalmente Conectada</a:t>
+            </a:r>
+          </a:p>
+        </p:txBody>
+      </p:sp>
+      <p:sp>
+        <p:nvSpPr>
+          <p:cNvPr id="3" name="Espaço Reservado para Conteúdo 2">
+            <a:extLst>
+              <a:ext uri="{FF2B5EF4-FFF2-40B4-BE49-F238E27FC236}">
+                <a16:creationId xmlns:a16="http://schemas.microsoft.com/office/drawing/2014/main" id="{D5295E40-2422-1BF1-5D9D-7C617DC934CA}"/>
+              </a:ext>
+            </a:extLst>
+          </p:cNvPr>
+          <p:cNvSpPr>
+            <a:spLocks noGrp="1"/>
+          </p:cNvSpPr>
+          <p:nvPr>
+            <p:ph idx="1"/>
+          </p:nvPr>
+        </p:nvSpPr>
+        <p:spPr/>
+        <p:txBody>
+          <a:bodyPr/>
+          <a:lstStyle/>
+          <a:p>
+            <a:r>
+              <a:rPr lang="pt-BR" dirty="0"/>
+              <a:t>Funcionamento:</a:t>
+            </a:r>
+          </a:p>
+        </p:txBody>
+      </p:sp>
+      <p:sp>
+        <p:nvSpPr>
+          <p:cNvPr id="4" name="CaixaDeTexto 3">
+            <a:extLst>
+              <a:ext uri="{FF2B5EF4-FFF2-40B4-BE49-F238E27FC236}">
+                <a16:creationId xmlns:a16="http://schemas.microsoft.com/office/drawing/2014/main" id="{567482A3-1C3A-6DE5-B768-E99D2AF9E530}"/>
+              </a:ext>
+            </a:extLst>
+          </p:cNvPr>
+          <p:cNvSpPr txBox="1"/>
+          <p:nvPr/>
+        </p:nvSpPr>
+        <p:spPr>
+          <a:xfrm>
+            <a:off x="1959430" y="3354963"/>
+            <a:ext cx="3454400" cy="646331"/>
+          </a:xfrm>
+          <a:prstGeom prst="rect">
+            <a:avLst/>
+          </a:prstGeom>
+          <a:noFill/>
+        </p:spPr>
+        <p:txBody>
+          <a:bodyPr wrap="square" rtlCol="0">
+            <a:spAutoFit/>
+          </a:bodyPr>
+          <a:lstStyle/>
+          <a:p>
+            <a:r>
+              <a:rPr lang="pt-BR" dirty="0"/>
+              <a:t>Aqui vai uma imagem que ainda não terminei de confeccionar</a:t>
+            </a:r>
+          </a:p>
+        </p:txBody>
+      </p:sp>
+      <p:sp>
+        <p:nvSpPr>
+          <p:cNvPr id="5" name="CaixaDeTexto 4">
+            <a:extLst>
+              <a:ext uri="{FF2B5EF4-FFF2-40B4-BE49-F238E27FC236}">
+                <a16:creationId xmlns:a16="http://schemas.microsoft.com/office/drawing/2014/main" id="{280537E6-CA94-04AA-38FA-482882E51306}"/>
+              </a:ext>
+            </a:extLst>
+          </p:cNvPr>
+          <p:cNvSpPr txBox="1"/>
+          <p:nvPr/>
+        </p:nvSpPr>
+        <p:spPr>
+          <a:xfrm>
+            <a:off x="7141028" y="3443736"/>
+            <a:ext cx="3091542" cy="646331"/>
+          </a:xfrm>
+          <a:prstGeom prst="rect">
+            <a:avLst/>
+          </a:prstGeom>
+          <a:noFill/>
+        </p:spPr>
+        <p:txBody>
+          <a:bodyPr wrap="square" rtlCol="0">
+            <a:spAutoFit/>
+          </a:bodyPr>
+          <a:lstStyle/>
+          <a:p>
+            <a:r>
+              <a:rPr lang="pt-BR" dirty="0"/>
+              <a:t>Aqui vai uma explicação bem difícil e complicada</a:t>
+            </a:r>
+          </a:p>
+        </p:txBody>
+      </p:sp>
+    </p:spTree>
+    <p:extLst>
+      <p:ext uri="{BB962C8B-B14F-4D97-AF65-F5344CB8AC3E}">
+        <p14:creationId xmlns:p14="http://schemas.microsoft.com/office/powerpoint/2010/main" val="2045010405"/>
+      </p:ext>
+    </p:extLst>
+  </p:cSld>
+  <p:clrMapOvr>
+    <a:masterClrMapping/>
+  </p:clrMapOvr>
+</p:sld>
+</file>
+
+<file path=ppt/slides/slide31.xml><?xml version="1.0" encoding="utf-8"?>
+<p:sld xmlns:a="http://schemas.openxmlformats.org/drawingml/2006/main" xmlns:r="http://schemas.openxmlformats.org/officeDocument/2006/relationships" xmlns:p="http://schemas.openxmlformats.org/presentationml/2006/main">
+  <p:cSld>
+    <p:spTree>
+      <p:nvGrpSpPr>
+        <p:cNvPr id="1" name=""/>
+        <p:cNvGrpSpPr/>
+        <p:nvPr/>
+      </p:nvGrpSpPr>
+      <p:grpSpPr>
+        <a:xfrm>
+          <a:off x="0" y="0"/>
+          <a:ext cx="0" cy="0"/>
+          <a:chOff x="0" y="0"/>
+          <a:chExt cx="0" cy="0"/>
+        </a:xfrm>
+      </p:grpSpPr>
+      <p:sp>
+        <p:nvSpPr>
+          <p:cNvPr id="2" name="Título 1">
+            <a:extLst>
+              <a:ext uri="{FF2B5EF4-FFF2-40B4-BE49-F238E27FC236}">
+                <a16:creationId xmlns:a16="http://schemas.microsoft.com/office/drawing/2014/main" id="{7DFFC327-BD67-51A4-3F68-AAC1BDAFAD20}"/>
+              </a:ext>
+            </a:extLst>
+          </p:cNvPr>
+          <p:cNvSpPr>
+            <a:spLocks noGrp="1"/>
+          </p:cNvSpPr>
+          <p:nvPr>
+            <p:ph type="title"/>
+          </p:nvPr>
+        </p:nvSpPr>
+        <p:spPr/>
+        <p:txBody>
+          <a:bodyPr/>
+          <a:lstStyle/>
+          <a:p>
+            <a:pPr algn="ctr"/>
+            <a:r>
+              <a:rPr lang="pt-BR" b="1" dirty="0"/>
+              <a:t>YOLO!!!!</a:t>
+            </a:r>
+          </a:p>
+        </p:txBody>
+      </p:sp>
+      <p:sp>
+        <p:nvSpPr>
+          <p:cNvPr id="3" name="Espaço Reservado para Conteúdo 2">
+            <a:extLst>
+              <a:ext uri="{FF2B5EF4-FFF2-40B4-BE49-F238E27FC236}">
+                <a16:creationId xmlns:a16="http://schemas.microsoft.com/office/drawing/2014/main" id="{C349FEAE-B13B-4CF8-2301-EEEDB47408CB}"/>
+              </a:ext>
+            </a:extLst>
+          </p:cNvPr>
+          <p:cNvSpPr>
+            <a:spLocks noGrp="1"/>
+          </p:cNvSpPr>
+          <p:nvPr>
+            <p:ph idx="1"/>
+          </p:nvPr>
+        </p:nvSpPr>
+        <p:spPr/>
+        <p:txBody>
+          <a:bodyPr/>
+          <a:lstStyle/>
+          <a:p>
+            <a:r>
+              <a:rPr lang="pt-BR" dirty="0"/>
+              <a:t>Arquitetura usando FCN;</a:t>
+            </a:r>
+          </a:p>
+          <a:p>
+            <a:endParaRPr lang="pt-BR" dirty="0"/>
+          </a:p>
+          <a:p>
+            <a:r>
+              <a:rPr lang="pt-BR" dirty="0"/>
+              <a:t>Método rápido e preciso de detecção de objetos;</a:t>
+            </a:r>
+          </a:p>
+          <a:p>
+            <a:pPr lvl="1"/>
+            <a:r>
+              <a:rPr lang="pt-BR" dirty="0"/>
+              <a:t>Detecta em tempo real para vídeos;</a:t>
+            </a:r>
+          </a:p>
+          <a:p>
+            <a:pPr lvl="1"/>
+            <a:endParaRPr lang="pt-BR" dirty="0"/>
+          </a:p>
+          <a:p>
+            <a:r>
+              <a:rPr lang="pt-BR" dirty="0"/>
+              <a:t>Código aberto desenvolvido em C;</a:t>
+            </a:r>
+          </a:p>
+          <a:p>
+            <a:pPr lvl="1"/>
+            <a:r>
+              <a:rPr lang="pt-BR" dirty="0"/>
+              <a:t>Diversas variantes;</a:t>
+            </a:r>
+          </a:p>
+          <a:p>
+            <a:endParaRPr lang="pt-BR" dirty="0"/>
+          </a:p>
+          <a:p>
+            <a:endParaRPr lang="pt-BR" dirty="0"/>
+          </a:p>
+        </p:txBody>
+      </p:sp>
+      <p:pic>
+        <p:nvPicPr>
+          <p:cNvPr id="3074" name="Picture 2" descr="YOLO: Real-Time Object Detection">
+            <a:extLst>
+              <a:ext uri="{FF2B5EF4-FFF2-40B4-BE49-F238E27FC236}">
+                <a16:creationId xmlns:a16="http://schemas.microsoft.com/office/drawing/2014/main" id="{F70A3EB4-E6DF-3BF2-7FB0-020D5171B100}"/>
+              </a:ext>
+            </a:extLst>
+          </p:cNvPr>
+          <p:cNvPicPr>
+            <a:picLocks noChangeAspect="1" noChangeArrowheads="1"/>
+          </p:cNvPicPr>
+          <p:nvPr/>
+        </p:nvPicPr>
+        <p:blipFill>
+          <a:blip r:embed="rId2">
+            <a:extLst>
+              <a:ext uri="{28A0092B-C50C-407E-A947-70E740481C1C}">
+                <a14:useLocalDpi xmlns:a14="http://schemas.microsoft.com/office/drawing/2010/main" val="0"/>
+              </a:ext>
+            </a:extLst>
+          </a:blip>
+          <a:srcRect/>
+          <a:stretch>
+            <a:fillRect/>
+          </a:stretch>
+        </p:blipFill>
+        <p:spPr bwMode="auto">
+          <a:xfrm>
+            <a:off x="7121635" y="3834260"/>
+            <a:ext cx="4232165" cy="2239750"/>
+          </a:xfrm>
+          <a:prstGeom prst="rect">
+            <a:avLst/>
+          </a:prstGeom>
+          <a:noFill/>
+          <a:extLst>
+            <a:ext uri="{909E8E84-426E-40DD-AFC4-6F175D3DCCD1}">
+              <a14:hiddenFill xmlns:a14="http://schemas.microsoft.com/office/drawing/2010/main">
+                <a:solidFill>
+                  <a:srgbClr val="FFFFFF"/>
+                </a:solidFill>
+              </a14:hiddenFill>
+            </a:ext>
+          </a:extLst>
+        </p:spPr>
+      </p:pic>
+    </p:spTree>
+    <p:extLst>
+      <p:ext uri="{BB962C8B-B14F-4D97-AF65-F5344CB8AC3E}">
+        <p14:creationId xmlns:p14="http://schemas.microsoft.com/office/powerpoint/2010/main" val="2347127880"/>
+      </p:ext>
+    </p:extLst>
+  </p:cSld>
+  <p:clrMapOvr>
+    <a:masterClrMapping/>
+  </p:clrMapOvr>
+</p:sld>
+</file>
+
+<file path=ppt/slides/slide32.xml><?xml version="1.0" encoding="utf-8"?>
+<p:sld xmlns:a="http://schemas.openxmlformats.org/drawingml/2006/main" xmlns:r="http://schemas.openxmlformats.org/officeDocument/2006/relationships" xmlns:p="http://schemas.openxmlformats.org/presentationml/2006/main">
+  <p:cSld>
+    <p:spTree>
+      <p:nvGrpSpPr>
+        <p:cNvPr id="1" name=""/>
+        <p:cNvGrpSpPr/>
+        <p:nvPr/>
+      </p:nvGrpSpPr>
+      <p:grpSpPr>
+        <a:xfrm>
+          <a:off x="0" y="0"/>
+          <a:ext cx="0" cy="0"/>
+          <a:chOff x="0" y="0"/>
+          <a:chExt cx="0" cy="0"/>
+        </a:xfrm>
+      </p:grpSpPr>
+      <p:sp>
+        <p:nvSpPr>
+          <p:cNvPr id="2" name="Título 1">
+            <a:extLst>
+              <a:ext uri="{FF2B5EF4-FFF2-40B4-BE49-F238E27FC236}">
+                <a16:creationId xmlns:a16="http://schemas.microsoft.com/office/drawing/2014/main" id="{2386AFF4-5EA8-2DC4-ACF6-93599C913C54}"/>
+              </a:ext>
+            </a:extLst>
+          </p:cNvPr>
+          <p:cNvSpPr>
+            <a:spLocks noGrp="1"/>
+          </p:cNvSpPr>
+          <p:nvPr>
+            <p:ph type="title"/>
+          </p:nvPr>
+        </p:nvSpPr>
+        <p:spPr/>
+        <p:txBody>
+          <a:bodyPr/>
+          <a:lstStyle/>
+          <a:p>
+            <a:r>
+              <a:rPr lang="pt-BR" dirty="0"/>
+              <a:t>Implementação?</a:t>
+            </a:r>
+          </a:p>
+        </p:txBody>
+      </p:sp>
+      <p:sp>
+        <p:nvSpPr>
+          <p:cNvPr id="3" name="Espaço Reservado para Conteúdo 2">
+            <a:extLst>
+              <a:ext uri="{FF2B5EF4-FFF2-40B4-BE49-F238E27FC236}">
+                <a16:creationId xmlns:a16="http://schemas.microsoft.com/office/drawing/2014/main" id="{E3117AAB-C42E-2863-9F6F-82F775BA3BD0}"/>
+              </a:ext>
+            </a:extLst>
+          </p:cNvPr>
+          <p:cNvSpPr>
+            <a:spLocks noGrp="1"/>
+          </p:cNvSpPr>
+          <p:nvPr>
+            <p:ph idx="1"/>
+          </p:nvPr>
+        </p:nvSpPr>
+        <p:spPr/>
+        <p:txBody>
+          <a:bodyPr/>
+          <a:lstStyle/>
+          <a:p>
+            <a:r>
+              <a:rPr lang="pt-BR" dirty="0"/>
+              <a:t>Sei não....</a:t>
+            </a:r>
+          </a:p>
+        </p:txBody>
+      </p:sp>
+    </p:spTree>
+    <p:extLst>
+      <p:ext uri="{BB962C8B-B14F-4D97-AF65-F5344CB8AC3E}">
+        <p14:creationId xmlns:p14="http://schemas.microsoft.com/office/powerpoint/2010/main" val="3722881240"/>
       </p:ext>
     </p:extLst>
   </p:cSld>

</xml_diff>